<commit_message>
Fine quesito 4 team
</commit_message>
<xml_diff>
--- a/Quesito 4 Team/Quesito4-presentazione.pptx
+++ b/Quesito 4 Team/Quesito4-presentazione.pptx
@@ -18,6 +18,7 @@
     <p:sldId id="263" r:id="rId12"/>
     <p:sldId id="264" r:id="rId13"/>
     <p:sldId id="265" r:id="rId14"/>
+    <p:sldId id="269" r:id="rId15"/>
   </p:sldIdLst>
   <p:sldSz cx="9144000" cy="6858000" type="screen4x3"/>
   <p:notesSz cx="6858000" cy="9144000"/>
@@ -354,7 +355,7 @@
           <a:p>
             <a:fld id="{D140825E-4A15-4D39-8176-1F07E904CB30}" type="datetimeFigureOut">
               <a:rPr lang="en-US" smtClean="0"/>
-              <a:t>04/04/16</a:t>
+              <a:t>05/04/16</a:t>
             </a:fld>
             <a:endParaRPr lang="en-US"/>
           </a:p>
@@ -445,7 +446,7 @@
           <a:p>
             <a:fld id="{D140825E-4A15-4D39-8176-1F07E904CB30}" type="datetimeFigureOut">
               <a:rPr lang="en-US" smtClean="0"/>
-              <a:t>04/04/16</a:t>
+              <a:t>05/04/16</a:t>
             </a:fld>
             <a:endParaRPr lang="en-US"/>
           </a:p>
@@ -748,7 +749,7 @@
           <a:p>
             <a:fld id="{D140825E-4A15-4D39-8176-1F07E904CB30}" type="datetimeFigureOut">
               <a:rPr lang="en-US" smtClean="0"/>
-              <a:t>04/04/16</a:t>
+              <a:t>05/04/16</a:t>
             </a:fld>
             <a:endParaRPr lang="en-US"/>
           </a:p>
@@ -969,7 +970,7 @@
           <a:p>
             <a:fld id="{D140825E-4A15-4D39-8176-1F07E904CB30}" type="datetimeFigureOut">
               <a:rPr lang="en-US" smtClean="0"/>
-              <a:t>04/04/16</a:t>
+              <a:t>05/04/16</a:t>
             </a:fld>
             <a:endParaRPr lang="en-US"/>
           </a:p>
@@ -1357,7 +1358,7 @@
           <a:p>
             <a:fld id="{D140825E-4A15-4D39-8176-1F07E904CB30}" type="datetimeFigureOut">
               <a:rPr lang="en-US" smtClean="0"/>
-              <a:t>04/04/16</a:t>
+              <a:t>05/04/16</a:t>
             </a:fld>
             <a:endParaRPr lang="en-US"/>
           </a:p>
@@ -1665,7 +1666,7 @@
           <a:p>
             <a:fld id="{D140825E-4A15-4D39-8176-1F07E904CB30}" type="datetimeFigureOut">
               <a:rPr lang="en-US" smtClean="0"/>
-              <a:t>04/04/16</a:t>
+              <a:t>05/04/16</a:t>
             </a:fld>
             <a:endParaRPr lang="en-US"/>
           </a:p>
@@ -1863,7 +1864,7 @@
           <a:p>
             <a:fld id="{D140825E-4A15-4D39-8176-1F07E904CB30}" type="datetimeFigureOut">
               <a:rPr lang="en-US" smtClean="0"/>
-              <a:t>04/04/16</a:t>
+              <a:t>05/04/16</a:t>
             </a:fld>
             <a:endParaRPr lang="en-US"/>
           </a:p>
@@ -2066,7 +2067,7 @@
           <a:p>
             <a:fld id="{D140825E-4A15-4D39-8176-1F07E904CB30}" type="datetimeFigureOut">
               <a:rPr lang="en-US" smtClean="0"/>
-              <a:t>04/04/16</a:t>
+              <a:t>05/04/16</a:t>
             </a:fld>
             <a:endParaRPr lang="en-US"/>
           </a:p>
@@ -2259,7 +2260,7 @@
           <a:p>
             <a:fld id="{D140825E-4A15-4D39-8176-1F07E904CB30}" type="datetimeFigureOut">
               <a:rPr lang="en-US" smtClean="0"/>
-              <a:t>04/04/16</a:t>
+              <a:t>05/04/16</a:t>
             </a:fld>
             <a:endParaRPr lang="en-US"/>
           </a:p>
@@ -2531,7 +2532,7 @@
           <a:p>
             <a:fld id="{D140825E-4A15-4D39-8176-1F07E904CB30}" type="datetimeFigureOut">
               <a:rPr lang="en-US" smtClean="0"/>
-              <a:t>04/04/16</a:t>
+              <a:t>05/04/16</a:t>
             </a:fld>
             <a:endParaRPr lang="en-US"/>
           </a:p>
@@ -2842,7 +2843,7 @@
           <a:p>
             <a:fld id="{D140825E-4A15-4D39-8176-1F07E904CB30}" type="datetimeFigureOut">
               <a:rPr lang="en-US" smtClean="0"/>
-              <a:t>04/04/16</a:t>
+              <a:t>05/04/16</a:t>
             </a:fld>
             <a:endParaRPr lang="en-US"/>
           </a:p>
@@ -3308,7 +3309,7 @@
           <a:p>
             <a:fld id="{D140825E-4A15-4D39-8176-1F07E904CB30}" type="datetimeFigureOut">
               <a:rPr lang="en-US" smtClean="0"/>
-              <a:t>04/04/16</a:t>
+              <a:t>05/04/16</a:t>
             </a:fld>
             <a:endParaRPr lang="en-US"/>
           </a:p>
@@ -3672,7 +3673,7 @@
           <a:p>
             <a:fld id="{D140825E-4A15-4D39-8176-1F07E904CB30}" type="datetimeFigureOut">
               <a:rPr lang="en-US" smtClean="0"/>
-              <a:t>04/04/16</a:t>
+              <a:t>05/04/16</a:t>
             </a:fld>
             <a:endParaRPr lang="en-US"/>
           </a:p>
@@ -3983,7 +3984,7 @@
           <a:p>
             <a:fld id="{D140825E-4A15-4D39-8176-1F07E904CB30}" type="datetimeFigureOut">
               <a:rPr lang="en-US" smtClean="0"/>
-              <a:t>04/04/16</a:t>
+              <a:t>05/04/16</a:t>
             </a:fld>
             <a:endParaRPr lang="en-US"/>
           </a:p>
@@ -4294,7 +4295,7 @@
           <a:p>
             <a:fld id="{D140825E-4A15-4D39-8176-1F07E904CB30}" type="datetimeFigureOut">
               <a:rPr lang="en-US" smtClean="0"/>
-              <a:t>04/04/16</a:t>
+              <a:t>05/04/16</a:t>
             </a:fld>
             <a:endParaRPr lang="en-US"/>
           </a:p>
@@ -4779,7 +4780,7 @@
           <a:p>
             <a:fld id="{D140825E-4A15-4D39-8176-1F07E904CB30}" type="datetimeFigureOut">
               <a:rPr lang="en-US" smtClean="0"/>
-              <a:t>04/04/16</a:t>
+              <a:t>05/04/16</a:t>
             </a:fld>
             <a:endParaRPr lang="en-US"/>
           </a:p>
@@ -5042,7 +5043,7 @@
           <a:p>
             <a:fld id="{D140825E-4A15-4D39-8176-1F07E904CB30}" type="datetimeFigureOut">
               <a:rPr lang="en-US" smtClean="0"/>
-              <a:t>04/04/16</a:t>
+              <a:t>05/04/16</a:t>
             </a:fld>
             <a:endParaRPr lang="en-US"/>
           </a:p>
@@ -5718,7 +5719,23 @@
                   <a:srgbClr val="FFFF00"/>
                 </a:solidFill>
               </a:rPr>
-              <a:t>ISW </a:t>
+              <a:t>ISW – </a:t>
+            </a:r>
+            <a:r>
+              <a:rPr lang="en-US" sz="2800" dirty="0" err="1" smtClean="0">
+                <a:solidFill>
+                  <a:srgbClr val="FFFF00"/>
+                </a:solidFill>
+              </a:rPr>
+              <a:t>Gruppo</a:t>
+            </a:r>
+            <a:r>
+              <a:rPr lang="en-US" sz="2800" dirty="0">
+                <a:solidFill>
+                  <a:srgbClr val="FFFF00"/>
+                </a:solidFill>
+              </a:rPr>
+              <a:t> </a:t>
             </a:r>
             <a:r>
               <a:rPr lang="en-US" sz="2800" dirty="0" smtClean="0">
@@ -5726,55 +5743,7 @@
                   <a:srgbClr val="FFFF00"/>
                 </a:solidFill>
               </a:rPr>
-              <a:t>–</a:t>
-            </a:r>
-            <a:r>
-              <a:rPr lang="en-US" sz="2800" dirty="0" smtClean="0">
-                <a:solidFill>
-                  <a:srgbClr val="FFFF00"/>
-                </a:solidFill>
-              </a:rPr>
-              <a:t> </a:t>
-            </a:r>
-            <a:r>
-              <a:rPr lang="en-US" sz="2800" dirty="0" err="1" smtClean="0">
-                <a:solidFill>
-                  <a:srgbClr val="FFFF00"/>
-                </a:solidFill>
-              </a:rPr>
-              <a:t>Gruppo</a:t>
-            </a:r>
-            <a:r>
-              <a:rPr lang="en-US" sz="2800" dirty="0">
-                <a:solidFill>
-                  <a:srgbClr val="FFFF00"/>
-                </a:solidFill>
-              </a:rPr>
-              <a:t> </a:t>
-            </a:r>
-            <a:r>
-              <a:rPr lang="en-US" sz="2800" dirty="0" smtClean="0">
-                <a:solidFill>
-                  <a:srgbClr val="FFFF00"/>
-                </a:solidFill>
-              </a:rPr>
-              <a:t>01 </a:t>
-            </a:r>
-            <a:r>
-              <a:rPr lang="en-US" sz="2800" dirty="0" smtClean="0">
-                <a:solidFill>
-                  <a:srgbClr val="FFFF00"/>
-                </a:solidFill>
-              </a:rPr>
-              <a:t>–</a:t>
-            </a:r>
-            <a:r>
-              <a:rPr lang="en-US" sz="2800" dirty="0" smtClean="0">
-                <a:solidFill>
-                  <a:srgbClr val="FFFF00"/>
-                </a:solidFill>
-              </a:rPr>
-              <a:t> </a:t>
+              <a:t>01 – </a:t>
             </a:r>
             <a:r>
               <a:rPr lang="en-US" sz="2800" dirty="0" err="1" smtClean="0">
@@ -7225,11 +7194,7 @@
             </a:r>
             <a:r>
               <a:rPr lang="en-US" sz="4400" b="1" dirty="0" smtClean="0"/>
-              <a:t>°</a:t>
-            </a:r>
-            <a:r>
-              <a:rPr lang="en-US" sz="4400" b="1" dirty="0" smtClean="0"/>
-              <a:t>soluzione </a:t>
+              <a:t>°soluzione </a:t>
             </a:r>
             <a:r>
               <a:rPr lang="en-US" sz="4400" b="1" dirty="0" err="1" smtClean="0"/>
@@ -8084,6 +8049,139 @@
       <p:bldP spid="5" grpId="0"/>
     </p:bldLst>
   </p:timing>
+</p:sld>
+</file>
+
+<file path=ppt/slides/slide14.xml><?xml version="1.0" encoding="utf-8"?>
+<p:sld xmlns:a="http://schemas.openxmlformats.org/drawingml/2006/main" xmlns:r="http://schemas.openxmlformats.org/officeDocument/2006/relationships" xmlns:p="http://schemas.openxmlformats.org/presentationml/2006/main">
+  <p:cSld>
+    <p:spTree>
+      <p:nvGrpSpPr>
+        <p:cNvPr id="1" name=""/>
+        <p:cNvGrpSpPr/>
+        <p:nvPr/>
+      </p:nvGrpSpPr>
+      <p:grpSpPr>
+        <a:xfrm>
+          <a:off x="0" y="0"/>
+          <a:ext cx="0" cy="0"/>
+          <a:chOff x="0" y="0"/>
+          <a:chExt cx="0" cy="0"/>
+        </a:xfrm>
+      </p:grpSpPr>
+      <p:pic>
+        <p:nvPicPr>
+          <p:cNvPr id="9" name="Picture 8" descr="12957364_10209316861747691_561313708_n.jpg"/>
+          <p:cNvPicPr>
+            <a:picLocks noChangeAspect="1"/>
+          </p:cNvPicPr>
+          <p:nvPr/>
+        </p:nvPicPr>
+        <p:blipFill>
+          <a:blip r:embed="rId2">
+            <a:extLst>
+              <a:ext uri="{28A0092B-C50C-407E-A947-70E740481C1C}">
+                <a14:useLocalDpi xmlns:a14="http://schemas.microsoft.com/office/drawing/2010/main" val="0"/>
+              </a:ext>
+            </a:extLst>
+          </a:blip>
+          <a:stretch>
+            <a:fillRect/>
+          </a:stretch>
+        </p:blipFill>
+        <p:spPr>
+          <a:xfrm>
+            <a:off x="956690" y="1626656"/>
+            <a:ext cx="7331064" cy="3461997"/>
+          </a:xfrm>
+          <a:prstGeom prst="rect">
+            <a:avLst/>
+          </a:prstGeom>
+        </p:spPr>
+      </p:pic>
+      <p:sp>
+        <p:nvSpPr>
+          <p:cNvPr id="10" name="TextBox 9"/>
+          <p:cNvSpPr txBox="1"/>
+          <p:nvPr/>
+        </p:nvSpPr>
+        <p:spPr>
+          <a:xfrm>
+            <a:off x="956690" y="554788"/>
+            <a:ext cx="7056138" cy="830997"/>
+          </a:xfrm>
+          <a:prstGeom prst="rect">
+            <a:avLst/>
+          </a:prstGeom>
+          <a:noFill/>
+        </p:spPr>
+        <p:txBody>
+          <a:bodyPr wrap="none" rtlCol="0">
+            <a:spAutoFit/>
+          </a:bodyPr>
+          <a:lstStyle/>
+          <a:p>
+            <a:r>
+              <a:rPr lang="en-US" sz="4800" b="1" dirty="0" smtClean="0"/>
+              <a:t>Grazie per l’ </a:t>
+            </a:r>
+            <a:r>
+              <a:rPr lang="en-US" sz="4800" b="1" dirty="0" err="1" smtClean="0"/>
+              <a:t>attenzione</a:t>
+            </a:r>
+            <a:endParaRPr lang="en-US" sz="4800" b="1" dirty="0"/>
+          </a:p>
+        </p:txBody>
+      </p:sp>
+      <p:sp>
+        <p:nvSpPr>
+          <p:cNvPr id="11" name="TextBox 10"/>
+          <p:cNvSpPr txBox="1"/>
+          <p:nvPr/>
+        </p:nvSpPr>
+        <p:spPr>
+          <a:xfrm>
+            <a:off x="956690" y="5308038"/>
+            <a:ext cx="7331064" cy="830997"/>
+          </a:xfrm>
+          <a:prstGeom prst="rect">
+            <a:avLst/>
+          </a:prstGeom>
+          <a:noFill/>
+        </p:spPr>
+        <p:txBody>
+          <a:bodyPr wrap="square" rtlCol="0">
+            <a:spAutoFit/>
+          </a:bodyPr>
+          <a:lstStyle/>
+          <a:p>
+            <a:pPr algn="ctr"/>
+            <a:r>
+              <a:rPr lang="en-US" sz="4800" b="1" dirty="0" err="1" smtClean="0">
+                <a:solidFill>
+                  <a:schemeClr val="bg1"/>
+                </a:solidFill>
+              </a:rPr>
+              <a:t>TeamSoftwareRevolution</a:t>
+            </a:r>
+            <a:endParaRPr lang="en-US" sz="4800" b="1" dirty="0">
+              <a:solidFill>
+                <a:schemeClr val="bg1"/>
+              </a:solidFill>
+            </a:endParaRPr>
+          </a:p>
+        </p:txBody>
+      </p:sp>
+    </p:spTree>
+    <p:extLst>
+      <p:ext uri="{BB962C8B-B14F-4D97-AF65-F5344CB8AC3E}">
+        <p14:creationId xmlns:p14="http://schemas.microsoft.com/office/powerpoint/2010/main" val="3617314204"/>
+      </p:ext>
+    </p:extLst>
+  </p:cSld>
+  <p:clrMapOvr>
+    <a:masterClrMapping/>
+  </p:clrMapOvr>
 </p:sld>
 </file>
 
@@ -10071,31 +10169,15 @@
                   <a:schemeClr val="bg1"/>
                 </a:solidFill>
               </a:rPr>
-              <a:t> (</a:t>
-            </a:r>
-            <a:r>
-              <a:rPr lang="en-US" sz="2200" dirty="0" smtClean="0">
+              <a:t> (Il </a:t>
+            </a:r>
+            <a:r>
+              <a:rPr lang="en-US" sz="2200" dirty="0" err="1" smtClean="0">
                 <a:solidFill>
                   <a:schemeClr val="bg1"/>
                 </a:solidFill>
               </a:rPr>
-              <a:t>Il </a:t>
-            </a:r>
-            <a:r>
-              <a:rPr lang="en-US" sz="2200" dirty="0" err="1" smtClean="0">
-                <a:solidFill>
-                  <a:schemeClr val="bg1"/>
-                </a:solidFill>
-              </a:rPr>
-              <a:t>l</a:t>
-            </a:r>
-            <a:r>
-              <a:rPr lang="en-US" sz="2200" dirty="0" err="1" smtClean="0">
-                <a:solidFill>
-                  <a:schemeClr val="bg1"/>
-                </a:solidFill>
-              </a:rPr>
-              <a:t>upo</a:t>
+              <a:t>lupo</a:t>
             </a:r>
             <a:r>
               <a:rPr lang="en-US" sz="2200" dirty="0" smtClean="0">
@@ -12132,7 +12214,7 @@
                   <a:srgbClr val="FFFFFF"/>
                 </a:solidFill>
               </a:rPr>
-              <a:t>predendere</a:t>
+              <a:t>prendere</a:t>
             </a:r>
             <a:r>
               <a:rPr lang="en-US" dirty="0" smtClean="0">

</xml_diff>